<commit_message>
Puestas tildes y cambiado FiltroAutenticacion por FiltroSeguridad. En el diagrama de componentes se llama filtroSeguridad porque no solo hace autenticacion sino tambien control de acceso.
</commit_message>
<xml_diff>
--- a/docs/Presentacion1/presentacion.pptx
+++ b/docs/Presentacion1/presentacion.pptx
@@ -194,7 +194,7 @@
       </p14:sectionLst>
     </p:ext>
     <p:ext uri="{EFAFB233-063F-42B5-8137-9DF3F51BA10A}">
-      <p15:sldGuideLst xmlns:p15="http://schemas.microsoft.com/office/powerpoint/2012/main"/>
+      <p15:sldGuideLst xmlns:p15="http://schemas.microsoft.com/office/powerpoint/2012/main" xmlns=""/>
     </p:ext>
   </p:extLst>
 </p:presentation>
@@ -205,7 +205,7 @@
   <p:cmAuthor id="1" name="Manuel" initials="M" lastIdx="4" clrIdx="0">
     <p:extLst>
       <p:ext uri="{19B8F6BF-5375-455C-9EA6-DF929625EA0E}">
-        <p15:presenceInfo xmlns:p15="http://schemas.microsoft.com/office/powerpoint/2012/main" userId="Manuel" providerId="None"/>
+        <p15:presenceInfo xmlns:p15="http://schemas.microsoft.com/office/powerpoint/2012/main" xmlns="" userId="Manuel" providerId="None"/>
       </p:ext>
     </p:extLst>
   </p:cmAuthor>
@@ -219,7 +219,7 @@
     <p:text>Es una demanda que realizan varios colectivos que interactuan durante el proceso como son Estudiante,Universidad, Bancos y estampadoras</p:text>
     <p:extLst mod="1">
       <p:ext uri="{C676402C-5697-4E1C-873F-D02D1690AC5C}">
-        <p15:threadingInfo xmlns:p15="http://schemas.microsoft.com/office/powerpoint/2012/main" timeZoneBias="-120"/>
+        <p15:threadingInfo xmlns:p15="http://schemas.microsoft.com/office/powerpoint/2012/main" xmlns="" timeZoneBias="-120"/>
       </p:ext>
     </p:extLst>
   </p:cm>
@@ -228,7 +228,7 @@
     <p:text>Quieren tener una manera telematica de poder gestionar la expedicion de tarjetas ahorrando de esta manera en gasto y agilizando los tramites para la tramitacion</p:text>
     <p:extLst mod="1">
       <p:ext uri="{C676402C-5697-4E1C-873F-D02D1690AC5C}">
-        <p15:threadingInfo xmlns:p15="http://schemas.microsoft.com/office/powerpoint/2012/main" timeZoneBias="-120"/>
+        <p15:threadingInfo xmlns:p15="http://schemas.microsoft.com/office/powerpoint/2012/main" xmlns="" timeZoneBias="-120"/>
       </p:ext>
     </p:extLst>
   </p:cm>
@@ -237,7 +237,7 @@
     <p:text>Es una necesidad real ya que no consiste en ofrecer un nuevo servicio, es decir, el servicio ya existe y se sabe que el numero de solicitudes es alto</p:text>
     <p:extLst mod="1">
       <p:ext uri="{C676402C-5697-4E1C-873F-D02D1690AC5C}">
-        <p15:threadingInfo xmlns:p15="http://schemas.microsoft.com/office/powerpoint/2012/main" timeZoneBias="-120"/>
+        <p15:threadingInfo xmlns:p15="http://schemas.microsoft.com/office/powerpoint/2012/main" xmlns="" timeZoneBias="-120"/>
       </p:ext>
     </p:extLst>
   </p:cm>
@@ -246,7 +246,7 @@
     <p:text>TIene que ser un sistema gestionado, que sea capaz de salvaguardar la integridad y la confidencialidad de los datos.</p:text>
     <p:extLst mod="1">
       <p:ext uri="{C676402C-5697-4E1C-873F-D02D1690AC5C}">
-        <p15:threadingInfo xmlns:p15="http://schemas.microsoft.com/office/powerpoint/2012/main" timeZoneBias="-120"/>
+        <p15:threadingInfo xmlns:p15="http://schemas.microsoft.com/office/powerpoint/2012/main" xmlns="" timeZoneBias="-120"/>
       </p:ext>
     </p:extLst>
   </p:cm>
@@ -335,7 +335,7 @@
           <a:p>
             <a:fld id="{A4F9DDE4-C59D-492B-9E70-A75C7207128B}" type="datetimeFigureOut">
               <a:rPr lang="es-ES" smtClean="0"/>
-              <a:t>05/04/2014</a:t>
+              <a:t>06/04/2014</a:t>
             </a:fld>
             <a:endParaRPr lang="es-ES"/>
           </a:p>
@@ -1481,7 +1481,7 @@
           <a:p>
             <a:fld id="{CD6E6494-75B3-47D3-B608-DA87015CD409}" type="datetimeFigureOut">
               <a:rPr lang="es-ES" smtClean="0"/>
-              <a:t>05/04/2014</a:t>
+              <a:t>06/04/2014</a:t>
             </a:fld>
             <a:endParaRPr lang="es-ES"/>
           </a:p>
@@ -1732,7 +1732,7 @@
           <a:p>
             <a:fld id="{CD6E6494-75B3-47D3-B608-DA87015CD409}" type="datetimeFigureOut">
               <a:rPr lang="es-ES" smtClean="0"/>
-              <a:t>05/04/2014</a:t>
+              <a:t>06/04/2014</a:t>
             </a:fld>
             <a:endParaRPr lang="es-ES"/>
           </a:p>
@@ -2046,7 +2046,7 @@
           <a:p>
             <a:fld id="{CD6E6494-75B3-47D3-B608-DA87015CD409}" type="datetimeFigureOut">
               <a:rPr lang="es-ES" smtClean="0"/>
-              <a:t>05/04/2014</a:t>
+              <a:t>06/04/2014</a:t>
             </a:fld>
             <a:endParaRPr lang="es-ES"/>
           </a:p>
@@ -2379,7 +2379,7 @@
           <a:p>
             <a:fld id="{CD6E6494-75B3-47D3-B608-DA87015CD409}" type="datetimeFigureOut">
               <a:rPr lang="es-ES" smtClean="0"/>
-              <a:t>05/04/2014</a:t>
+              <a:t>06/04/2014</a:t>
             </a:fld>
             <a:endParaRPr lang="es-ES"/>
           </a:p>
@@ -2693,7 +2693,7 @@
           <a:p>
             <a:fld id="{CD6E6494-75B3-47D3-B608-DA87015CD409}" type="datetimeFigureOut">
               <a:rPr lang="es-ES" smtClean="0"/>
-              <a:t>05/04/2014</a:t>
+              <a:t>06/04/2014</a:t>
             </a:fld>
             <a:endParaRPr lang="es-ES"/>
           </a:p>
@@ -3086,7 +3086,7 @@
           <a:p>
             <a:fld id="{CD6E6494-75B3-47D3-B608-DA87015CD409}" type="datetimeFigureOut">
               <a:rPr lang="es-ES" smtClean="0"/>
-              <a:t>05/04/2014</a:t>
+              <a:t>06/04/2014</a:t>
             </a:fld>
             <a:endParaRPr lang="es-ES"/>
           </a:p>
@@ -3256,7 +3256,7 @@
           <a:p>
             <a:fld id="{CD6E6494-75B3-47D3-B608-DA87015CD409}" type="datetimeFigureOut">
               <a:rPr lang="es-ES" smtClean="0"/>
-              <a:t>05/04/2014</a:t>
+              <a:t>06/04/2014</a:t>
             </a:fld>
             <a:endParaRPr lang="es-ES"/>
           </a:p>
@@ -3436,7 +3436,7 @@
           <a:p>
             <a:fld id="{CD6E6494-75B3-47D3-B608-DA87015CD409}" type="datetimeFigureOut">
               <a:rPr lang="es-ES" smtClean="0"/>
-              <a:t>05/04/2014</a:t>
+              <a:t>06/04/2014</a:t>
             </a:fld>
             <a:endParaRPr lang="es-ES"/>
           </a:p>
@@ -3606,7 +3606,7 @@
           <a:p>
             <a:fld id="{CD6E6494-75B3-47D3-B608-DA87015CD409}" type="datetimeFigureOut">
               <a:rPr lang="es-ES" smtClean="0"/>
-              <a:t>05/04/2014</a:t>
+              <a:t>06/04/2014</a:t>
             </a:fld>
             <a:endParaRPr lang="es-ES"/>
           </a:p>
@@ -3853,7 +3853,7 @@
           <a:p>
             <a:fld id="{CD6E6494-75B3-47D3-B608-DA87015CD409}" type="datetimeFigureOut">
               <a:rPr lang="es-ES" smtClean="0"/>
-              <a:t>05/04/2014</a:t>
+              <a:t>06/04/2014</a:t>
             </a:fld>
             <a:endParaRPr lang="es-ES"/>
           </a:p>
@@ -4150,7 +4150,7 @@
           <a:p>
             <a:fld id="{CD6E6494-75B3-47D3-B608-DA87015CD409}" type="datetimeFigureOut">
               <a:rPr lang="es-ES" smtClean="0"/>
-              <a:t>05/04/2014</a:t>
+              <a:t>06/04/2014</a:t>
             </a:fld>
             <a:endParaRPr lang="es-ES"/>
           </a:p>
@@ -4529,7 +4529,7 @@
           <a:p>
             <a:fld id="{CD6E6494-75B3-47D3-B608-DA87015CD409}" type="datetimeFigureOut">
               <a:rPr lang="es-ES" smtClean="0"/>
-              <a:t>05/04/2014</a:t>
+              <a:t>06/04/2014</a:t>
             </a:fld>
             <a:endParaRPr lang="es-ES"/>
           </a:p>
@@ -4652,7 +4652,7 @@
           <a:p>
             <a:fld id="{CD6E6494-75B3-47D3-B608-DA87015CD409}" type="datetimeFigureOut">
               <a:rPr lang="es-ES" smtClean="0"/>
-              <a:t>05/04/2014</a:t>
+              <a:t>06/04/2014</a:t>
             </a:fld>
             <a:endParaRPr lang="es-ES"/>
           </a:p>
@@ -4747,7 +4747,7 @@
           <a:p>
             <a:fld id="{CD6E6494-75B3-47D3-B608-DA87015CD409}" type="datetimeFigureOut">
               <a:rPr lang="es-ES" smtClean="0"/>
-              <a:t>05/04/2014</a:t>
+              <a:t>06/04/2014</a:t>
             </a:fld>
             <a:endParaRPr lang="es-ES"/>
           </a:p>
@@ -5002,7 +5002,7 @@
           <a:p>
             <a:fld id="{CD6E6494-75B3-47D3-B608-DA87015CD409}" type="datetimeFigureOut">
               <a:rPr lang="es-ES" smtClean="0"/>
-              <a:t>05/04/2014</a:t>
+              <a:t>06/04/2014</a:t>
             </a:fld>
             <a:endParaRPr lang="es-ES"/>
           </a:p>
@@ -5265,7 +5265,7 @@
           <a:p>
             <a:fld id="{CD6E6494-75B3-47D3-B608-DA87015CD409}" type="datetimeFigureOut">
               <a:rPr lang="es-ES" smtClean="0"/>
-              <a:t>05/04/2014</a:t>
+              <a:t>06/04/2014</a:t>
             </a:fld>
             <a:endParaRPr lang="es-ES"/>
           </a:p>
@@ -6079,7 +6079,7 @@
           <a:p>
             <a:fld id="{CD6E6494-75B3-47D3-B608-DA87015CD409}" type="datetimeFigureOut">
               <a:rPr lang="es-ES" smtClean="0"/>
-              <a:t>05/04/2014</a:t>
+              <a:t>06/04/2014</a:t>
             </a:fld>
             <a:endParaRPr lang="es-ES"/>
           </a:p>
@@ -6728,13 +6728,13 @@
   <p:clrMapOvr>
     <a:masterClrMapping/>
   </p:clrMapOvr>
-  <mc:AlternateContent xmlns:mc="http://schemas.openxmlformats.org/markup-compatibility/2006">
-    <mc:Choice xmlns:p14="http://schemas.microsoft.com/office/powerpoint/2010/main" Requires="p14">
+  <mc:AlternateContent xmlns:mc="http://schemas.openxmlformats.org/markup-compatibility/2006" xmlns:p14="http://schemas.microsoft.com/office/powerpoint/2010/main">
+    <mc:Choice Requires="p14">
       <p:transition spd="med" p14:dur="700">
         <p:fade/>
       </p:transition>
     </mc:Choice>
-    <mc:Fallback>
+    <mc:Fallback xmlns="">
       <p:transition spd="med">
         <p:fade/>
       </p:transition>
@@ -6805,13 +6805,13 @@
   <p:clrMapOvr>
     <a:masterClrMapping/>
   </p:clrMapOvr>
-  <mc:AlternateContent xmlns:mc="http://schemas.openxmlformats.org/markup-compatibility/2006">
-    <mc:Choice xmlns:p14="http://schemas.microsoft.com/office/powerpoint/2010/main" Requires="p14">
+  <mc:AlternateContent xmlns:mc="http://schemas.openxmlformats.org/markup-compatibility/2006" xmlns:p14="http://schemas.microsoft.com/office/powerpoint/2010/main">
+    <mc:Choice Requires="p14">
       <p:transition spd="med" p14:dur="700">
         <p:fade/>
       </p:transition>
     </mc:Choice>
-    <mc:Fallback>
+    <mc:Fallback xmlns="">
       <p:transition spd="med">
         <p:fade/>
       </p:transition>
@@ -6905,13 +6905,13 @@
   <p:clrMapOvr>
     <a:masterClrMapping/>
   </p:clrMapOvr>
-  <mc:AlternateContent xmlns:mc="http://schemas.openxmlformats.org/markup-compatibility/2006">
-    <mc:Choice xmlns:p14="http://schemas.microsoft.com/office/powerpoint/2010/main" Requires="p14">
+  <mc:AlternateContent xmlns:mc="http://schemas.openxmlformats.org/markup-compatibility/2006" xmlns:p14="http://schemas.microsoft.com/office/powerpoint/2010/main">
+    <mc:Choice Requires="p14">
       <p:transition spd="med" p14:dur="700">
         <p:fade/>
       </p:transition>
     </mc:Choice>
-    <mc:Fallback>
+    <mc:Fallback xmlns="">
       <p:transition spd="med">
         <p:fade/>
       </p:transition>
@@ -7005,13 +7005,13 @@
   <p:clrMapOvr>
     <a:masterClrMapping/>
   </p:clrMapOvr>
-  <mc:AlternateContent xmlns:mc="http://schemas.openxmlformats.org/markup-compatibility/2006">
-    <mc:Choice xmlns:p14="http://schemas.microsoft.com/office/powerpoint/2010/main" Requires="p14">
+  <mc:AlternateContent xmlns:mc="http://schemas.openxmlformats.org/markup-compatibility/2006" xmlns:p14="http://schemas.microsoft.com/office/powerpoint/2010/main">
+    <mc:Choice Requires="p14">
       <p:transition spd="med" p14:dur="700">
         <p:fade/>
       </p:transition>
     </mc:Choice>
-    <mc:Fallback>
+    <mc:Fallback xmlns="">
       <p:transition spd="med">
         <p:fade/>
       </p:transition>
@@ -7105,13 +7105,13 @@
   <p:clrMapOvr>
     <a:masterClrMapping/>
   </p:clrMapOvr>
-  <mc:AlternateContent xmlns:mc="http://schemas.openxmlformats.org/markup-compatibility/2006">
-    <mc:Choice xmlns:p14="http://schemas.microsoft.com/office/powerpoint/2010/main" Requires="p14">
+  <mc:AlternateContent xmlns:mc="http://schemas.openxmlformats.org/markup-compatibility/2006" xmlns:p14="http://schemas.microsoft.com/office/powerpoint/2010/main">
+    <mc:Choice Requires="p14">
       <p:transition spd="med" p14:dur="700">
         <p:fade/>
       </p:transition>
     </mc:Choice>
-    <mc:Fallback>
+    <mc:Fallback xmlns="">
       <p:transition spd="med">
         <p:fade/>
       </p:transition>
@@ -7205,13 +7205,13 @@
   <p:clrMapOvr>
     <a:masterClrMapping/>
   </p:clrMapOvr>
-  <mc:AlternateContent xmlns:mc="http://schemas.openxmlformats.org/markup-compatibility/2006">
-    <mc:Choice xmlns:p14="http://schemas.microsoft.com/office/powerpoint/2010/main" Requires="p14">
+  <mc:AlternateContent xmlns:mc="http://schemas.openxmlformats.org/markup-compatibility/2006" xmlns:p14="http://schemas.microsoft.com/office/powerpoint/2010/main">
+    <mc:Choice Requires="p14">
       <p:transition spd="med" p14:dur="700">
         <p:fade/>
       </p:transition>
     </mc:Choice>
-    <mc:Fallback>
+    <mc:Fallback xmlns="">
       <p:transition spd="med">
         <p:fade/>
       </p:transition>
@@ -7296,13 +7296,13 @@
   <p:clrMapOvr>
     <a:masterClrMapping/>
   </p:clrMapOvr>
-  <mc:AlternateContent xmlns:mc="http://schemas.openxmlformats.org/markup-compatibility/2006">
-    <mc:Choice xmlns:p14="http://schemas.microsoft.com/office/powerpoint/2010/main" Requires="p14">
+  <mc:AlternateContent xmlns:mc="http://schemas.openxmlformats.org/markup-compatibility/2006" xmlns:p14="http://schemas.microsoft.com/office/powerpoint/2010/main">
+    <mc:Choice Requires="p14">
       <p:transition spd="med" p14:dur="700">
         <p:fade/>
       </p:transition>
     </mc:Choice>
-    <mc:Fallback>
+    <mc:Fallback xmlns="">
       <p:transition spd="med">
         <p:fade/>
       </p:transition>
@@ -7468,13 +7468,13 @@
   <p:clrMapOvr>
     <a:masterClrMapping/>
   </p:clrMapOvr>
-  <mc:AlternateContent xmlns:mc="http://schemas.openxmlformats.org/markup-compatibility/2006">
-    <mc:Choice xmlns:p14="http://schemas.microsoft.com/office/powerpoint/2010/main" Requires="p14">
+  <mc:AlternateContent xmlns:mc="http://schemas.openxmlformats.org/markup-compatibility/2006" xmlns:p14="http://schemas.microsoft.com/office/powerpoint/2010/main">
+    <mc:Choice Requires="p14">
       <p:transition spd="med" p14:dur="700">
         <p:fade/>
       </p:transition>
     </mc:Choice>
-    <mc:Fallback>
+    <mc:Fallback xmlns="">
       <p:transition spd="med">
         <p:fade/>
       </p:transition>
@@ -7559,13 +7559,13 @@
   <p:clrMapOvr>
     <a:masterClrMapping/>
   </p:clrMapOvr>
-  <mc:AlternateContent xmlns:mc="http://schemas.openxmlformats.org/markup-compatibility/2006">
-    <mc:Choice xmlns:p14="http://schemas.microsoft.com/office/powerpoint/2010/main" Requires="p14">
+  <mc:AlternateContent xmlns:mc="http://schemas.openxmlformats.org/markup-compatibility/2006" xmlns:p14="http://schemas.microsoft.com/office/powerpoint/2010/main">
+    <mc:Choice Requires="p14">
       <p:transition spd="med" p14:dur="700">
         <p:fade/>
       </p:transition>
     </mc:Choice>
-    <mc:Fallback>
+    <mc:Fallback xmlns="">
       <p:transition spd="med">
         <p:fade/>
       </p:transition>
@@ -7647,13 +7647,13 @@
   <p:clrMapOvr>
     <a:masterClrMapping/>
   </p:clrMapOvr>
-  <mc:AlternateContent xmlns:mc="http://schemas.openxmlformats.org/markup-compatibility/2006">
-    <mc:Choice xmlns:p14="http://schemas.microsoft.com/office/powerpoint/2010/main" Requires="p14">
+  <mc:AlternateContent xmlns:mc="http://schemas.openxmlformats.org/markup-compatibility/2006" xmlns:p14="http://schemas.microsoft.com/office/powerpoint/2010/main">
+    <mc:Choice Requires="p14">
       <p:transition spd="med" p14:dur="700">
         <p:fade/>
       </p:transition>
     </mc:Choice>
-    <mc:Fallback>
+    <mc:Fallback xmlns="">
       <p:transition spd="med">
         <p:fade/>
       </p:transition>
@@ -7738,13 +7738,13 @@
   <p:clrMapOvr>
     <a:masterClrMapping/>
   </p:clrMapOvr>
-  <mc:AlternateContent xmlns:mc="http://schemas.openxmlformats.org/markup-compatibility/2006">
-    <mc:Choice xmlns:p14="http://schemas.microsoft.com/office/powerpoint/2010/main" Requires="p14">
+  <mc:AlternateContent xmlns:mc="http://schemas.openxmlformats.org/markup-compatibility/2006" xmlns:p14="http://schemas.microsoft.com/office/powerpoint/2010/main">
+    <mc:Choice Requires="p14">
       <p:transition spd="med" p14:dur="700">
         <p:fade/>
       </p:transition>
     </mc:Choice>
-    <mc:Fallback>
+    <mc:Fallback xmlns="">
       <p:transition spd="med">
         <p:fade/>
       </p:transition>
@@ -7829,13 +7829,13 @@
   <p:clrMapOvr>
     <a:masterClrMapping/>
   </p:clrMapOvr>
-  <mc:AlternateContent xmlns:mc="http://schemas.openxmlformats.org/markup-compatibility/2006">
-    <mc:Choice xmlns:p14="http://schemas.microsoft.com/office/powerpoint/2010/main" Requires="p14">
+  <mc:AlternateContent xmlns:mc="http://schemas.openxmlformats.org/markup-compatibility/2006" xmlns:p14="http://schemas.microsoft.com/office/powerpoint/2010/main">
+    <mc:Choice Requires="p14">
       <p:transition spd="med" p14:dur="700">
         <p:fade/>
       </p:transition>
     </mc:Choice>
-    <mc:Fallback>
+    <mc:Fallback xmlns="">
       <p:transition spd="med">
         <p:fade/>
       </p:transition>
@@ -7956,13 +7956,13 @@
   <p:clrMapOvr>
     <a:masterClrMapping/>
   </p:clrMapOvr>
-  <mc:AlternateContent xmlns:mc="http://schemas.openxmlformats.org/markup-compatibility/2006">
-    <mc:Choice xmlns:p14="http://schemas.microsoft.com/office/powerpoint/2010/main" Requires="p14">
+  <mc:AlternateContent xmlns:mc="http://schemas.openxmlformats.org/markup-compatibility/2006" xmlns:p14="http://schemas.microsoft.com/office/powerpoint/2010/main">
+    <mc:Choice Requires="p14">
       <p:transition spd="med" p14:dur="700">
         <p:fade/>
       </p:transition>
     </mc:Choice>
-    <mc:Fallback>
+    <mc:Fallback xmlns="">
       <p:transition spd="med">
         <p:fade/>
       </p:transition>
@@ -8047,13 +8047,13 @@
   <p:clrMapOvr>
     <a:masterClrMapping/>
   </p:clrMapOvr>
-  <mc:AlternateContent xmlns:mc="http://schemas.openxmlformats.org/markup-compatibility/2006">
-    <mc:Choice xmlns:p14="http://schemas.microsoft.com/office/powerpoint/2010/main" Requires="p14">
+  <mc:AlternateContent xmlns:mc="http://schemas.openxmlformats.org/markup-compatibility/2006" xmlns:p14="http://schemas.microsoft.com/office/powerpoint/2010/main">
+    <mc:Choice Requires="p14">
       <p:transition spd="med" p14:dur="700">
         <p:fade/>
       </p:transition>
     </mc:Choice>
-    <mc:Fallback>
+    <mc:Fallback xmlns="">
       <p:transition spd="med">
         <p:fade/>
       </p:transition>
@@ -8158,13 +8158,13 @@
   <p:clrMapOvr>
     <a:masterClrMapping/>
   </p:clrMapOvr>
-  <mc:AlternateContent xmlns:mc="http://schemas.openxmlformats.org/markup-compatibility/2006">
-    <mc:Choice xmlns:p14="http://schemas.microsoft.com/office/powerpoint/2010/main" Requires="p14">
+  <mc:AlternateContent xmlns:mc="http://schemas.openxmlformats.org/markup-compatibility/2006" xmlns:p14="http://schemas.microsoft.com/office/powerpoint/2010/main">
+    <mc:Choice Requires="p14">
       <p:transition spd="med" p14:dur="700">
         <p:fade/>
       </p:transition>
     </mc:Choice>
-    <mc:Fallback>
+    <mc:Fallback xmlns="">
       <p:transition spd="med">
         <p:fade/>
       </p:transition>
@@ -8248,13 +8248,13 @@
   <p:clrMapOvr>
     <a:masterClrMapping/>
   </p:clrMapOvr>
-  <mc:AlternateContent xmlns:mc="http://schemas.openxmlformats.org/markup-compatibility/2006">
-    <mc:Choice xmlns:p14="http://schemas.microsoft.com/office/powerpoint/2010/main" Requires="p14">
+  <mc:AlternateContent xmlns:mc="http://schemas.openxmlformats.org/markup-compatibility/2006" xmlns:p14="http://schemas.microsoft.com/office/powerpoint/2010/main">
+    <mc:Choice Requires="p14">
       <p:transition spd="med" p14:dur="700">
         <p:fade/>
       </p:transition>
     </mc:Choice>
-    <mc:Fallback>
+    <mc:Fallback xmlns="">
       <p:transition spd="med">
         <p:fade/>
       </p:transition>
@@ -8339,13 +8339,13 @@
   <p:clrMapOvr>
     <a:masterClrMapping/>
   </p:clrMapOvr>
-  <mc:AlternateContent xmlns:mc="http://schemas.openxmlformats.org/markup-compatibility/2006">
-    <mc:Choice xmlns:p14="http://schemas.microsoft.com/office/powerpoint/2010/main" Requires="p14">
+  <mc:AlternateContent xmlns:mc="http://schemas.openxmlformats.org/markup-compatibility/2006" xmlns:p14="http://schemas.microsoft.com/office/powerpoint/2010/main">
+    <mc:Choice Requires="p14">
       <p:transition spd="med" p14:dur="700">
         <p:fade/>
       </p:transition>
     </mc:Choice>
-    <mc:Fallback>
+    <mc:Fallback xmlns="">
       <p:transition spd="med">
         <p:fade/>
       </p:transition>
@@ -8489,13 +8489,13 @@
   <p:clrMapOvr>
     <a:masterClrMapping/>
   </p:clrMapOvr>
-  <mc:AlternateContent xmlns:mc="http://schemas.openxmlformats.org/markup-compatibility/2006">
-    <mc:Choice xmlns:p14="http://schemas.microsoft.com/office/powerpoint/2010/main" Requires="p14">
+  <mc:AlternateContent xmlns:mc="http://schemas.openxmlformats.org/markup-compatibility/2006" xmlns:p14="http://schemas.microsoft.com/office/powerpoint/2010/main">
+    <mc:Choice Requires="p14">
       <p:transition spd="med" p14:dur="700">
         <p:fade/>
       </p:transition>
     </mc:Choice>
-    <mc:Fallback>
+    <mc:Fallback xmlns="">
       <p:transition spd="med">
         <p:fade/>
       </p:transition>
@@ -8545,7 +8545,7 @@
           <a:p>
             <a:r>
               <a:rPr lang="es-ES" dirty="0" err="1" smtClean="0"/>
-              <a:t>FiltroAutenticacion</a:t>
+              <a:t>FiltroSeguridad</a:t>
             </a:r>
             <a:endParaRPr lang="es-ES" dirty="0"/>
           </a:p>
@@ -8906,13 +8906,13 @@
   <p:clrMapOvr>
     <a:masterClrMapping/>
   </p:clrMapOvr>
-  <mc:AlternateContent xmlns:mc="http://schemas.openxmlformats.org/markup-compatibility/2006">
-    <mc:Choice xmlns:p14="http://schemas.microsoft.com/office/powerpoint/2010/main" Requires="p14">
+  <mc:AlternateContent xmlns:mc="http://schemas.openxmlformats.org/markup-compatibility/2006" xmlns:p14="http://schemas.microsoft.com/office/powerpoint/2010/main">
+    <mc:Choice Requires="p14">
       <p:transition spd="med" p14:dur="700">
         <p:fade/>
       </p:transition>
     </mc:Choice>
-    <mc:Fallback>
+    <mc:Fallback xmlns="">
       <p:transition spd="med">
         <p:fade/>
       </p:transition>
@@ -9105,7 +9105,6 @@
               <a:rPr lang="es-ES" sz="2000" dirty="0"/>
               <a:t> si hubiese ya otra) =&gt; Vista siguiente.</a:t>
             </a:r>
-            <a:endParaRPr lang="es-ES" sz="2000" dirty="0"/>
           </a:p>
         </p:txBody>
       </p:sp>
@@ -9119,13 +9118,13 @@
   <p:clrMapOvr>
     <a:masterClrMapping/>
   </p:clrMapOvr>
-  <mc:AlternateContent xmlns:mc="http://schemas.openxmlformats.org/markup-compatibility/2006">
-    <mc:Choice xmlns:p14="http://schemas.microsoft.com/office/powerpoint/2010/main" Requires="p14">
+  <mc:AlternateContent xmlns:mc="http://schemas.openxmlformats.org/markup-compatibility/2006" xmlns:p14="http://schemas.microsoft.com/office/powerpoint/2010/main">
+    <mc:Choice Requires="p14">
       <p:transition spd="med" p14:dur="700">
         <p:fade/>
       </p:transition>
     </mc:Choice>
-    <mc:Fallback>
+    <mc:Fallback xmlns="">
       <p:transition spd="med">
         <p:fade/>
       </p:transition>
@@ -9473,7 +9472,6 @@
               <a:rPr lang="es-ES" dirty="0"/>
               <a:t>’.</a:t>
             </a:r>
-            <a:endParaRPr lang="es-ES" dirty="0"/>
           </a:p>
         </p:txBody>
       </p:sp>
@@ -9487,13 +9485,13 @@
   <p:clrMapOvr>
     <a:masterClrMapping/>
   </p:clrMapOvr>
-  <mc:AlternateContent xmlns:mc="http://schemas.openxmlformats.org/markup-compatibility/2006">
-    <mc:Choice xmlns:p14="http://schemas.microsoft.com/office/powerpoint/2010/main" Requires="p14">
+  <mc:AlternateContent xmlns:mc="http://schemas.openxmlformats.org/markup-compatibility/2006" xmlns:p14="http://schemas.microsoft.com/office/powerpoint/2010/main">
+    <mc:Choice Requires="p14">
       <p:transition spd="med" p14:dur="700">
         <p:fade/>
       </p:transition>
     </mc:Choice>
-    <mc:Fallback>
+    <mc:Fallback xmlns="">
       <p:transition spd="med">
         <p:fade/>
       </p:transition>
@@ -9739,7 +9737,6 @@
               <a:rPr lang="es-ES" dirty="0"/>
               <a:t>=&gt; Vista siguiente.</a:t>
             </a:r>
-            <a:endParaRPr lang="es-ES" dirty="0"/>
           </a:p>
         </p:txBody>
       </p:sp>
@@ -9753,13 +9750,13 @@
   <p:clrMapOvr>
     <a:masterClrMapping/>
   </p:clrMapOvr>
-  <mc:AlternateContent xmlns:mc="http://schemas.openxmlformats.org/markup-compatibility/2006">
-    <mc:Choice xmlns:p14="http://schemas.microsoft.com/office/powerpoint/2010/main" Requires="p14">
+  <mc:AlternateContent xmlns:mc="http://schemas.openxmlformats.org/markup-compatibility/2006" xmlns:p14="http://schemas.microsoft.com/office/powerpoint/2010/main">
+    <mc:Choice Requires="p14">
       <p:transition spd="med" p14:dur="700">
         <p:fade/>
       </p:transition>
     </mc:Choice>
-    <mc:Fallback>
+    <mc:Fallback xmlns="">
       <p:transition spd="med">
         <p:fade/>
       </p:transition>
@@ -9908,12 +9905,12 @@
               <a:t>¿Requisitos </a:t>
             </a:r>
             <a:r>
-              <a:rPr lang="es-ES" sz="4400" dirty="0" err="1">
+              <a:rPr lang="es-ES" sz="4400" dirty="0" smtClean="0">
                 <a:latin typeface="+mj-lt"/>
                 <a:ea typeface="+mj-ea"/>
                 <a:cs typeface="+mj-cs"/>
               </a:rPr>
-              <a:t>minimos</a:t>
+              <a:t>mínimos</a:t>
             </a:r>
             <a:r>
               <a:rPr lang="es-ES" sz="4400" dirty="0">
@@ -9936,13 +9933,13 @@
   <p:clrMapOvr>
     <a:masterClrMapping/>
   </p:clrMapOvr>
-  <mc:AlternateContent xmlns:mc="http://schemas.openxmlformats.org/markup-compatibility/2006">
-    <mc:Choice xmlns:p14="http://schemas.microsoft.com/office/powerpoint/2010/main" Requires="p14">
+  <mc:AlternateContent xmlns:mc="http://schemas.openxmlformats.org/markup-compatibility/2006" xmlns:p14="http://schemas.microsoft.com/office/powerpoint/2010/main">
+    <mc:Choice Requires="p14">
       <p:transition spd="med" p14:dur="700">
         <p:fade/>
       </p:transition>
     </mc:Choice>
-    <mc:Fallback>
+    <mc:Fallback xmlns="">
       <p:transition spd="med">
         <p:fade/>
       </p:transition>
@@ -10185,13 +10182,13 @@
   <p:clrMapOvr>
     <a:masterClrMapping/>
   </p:clrMapOvr>
-  <mc:AlternateContent xmlns:mc="http://schemas.openxmlformats.org/markup-compatibility/2006">
-    <mc:Choice xmlns:p14="http://schemas.microsoft.com/office/powerpoint/2010/main" Requires="p14">
+  <mc:AlternateContent xmlns:mc="http://schemas.openxmlformats.org/markup-compatibility/2006" xmlns:p14="http://schemas.microsoft.com/office/powerpoint/2010/main">
+    <mc:Choice Requires="p14">
       <p:transition spd="med" p14:dur="700">
         <p:fade/>
       </p:transition>
     </mc:Choice>
-    <mc:Fallback>
+    <mc:Fallback xmlns="">
       <p:transition spd="med">
         <p:fade/>
       </p:transition>
@@ -10276,13 +10273,13 @@
   <p:clrMapOvr>
     <a:masterClrMapping/>
   </p:clrMapOvr>
-  <mc:AlternateContent xmlns:mc="http://schemas.openxmlformats.org/markup-compatibility/2006">
-    <mc:Choice xmlns:p14="http://schemas.microsoft.com/office/powerpoint/2010/main" Requires="p14">
+  <mc:AlternateContent xmlns:mc="http://schemas.openxmlformats.org/markup-compatibility/2006" xmlns:p14="http://schemas.microsoft.com/office/powerpoint/2010/main">
+    <mc:Choice Requires="p14">
       <p:transition spd="med" p14:dur="700">
         <p:fade/>
       </p:transition>
     </mc:Choice>
-    <mc:Fallback>
+    <mc:Fallback xmlns="">
       <p:transition spd="med">
         <p:fade/>
       </p:transition>
@@ -10366,13 +10363,13 @@
   <p:clrMapOvr>
     <a:masterClrMapping/>
   </p:clrMapOvr>
-  <mc:AlternateContent xmlns:mc="http://schemas.openxmlformats.org/markup-compatibility/2006">
-    <mc:Choice xmlns:p14="http://schemas.microsoft.com/office/powerpoint/2010/main" Requires="p14">
+  <mc:AlternateContent xmlns:mc="http://schemas.openxmlformats.org/markup-compatibility/2006" xmlns:p14="http://schemas.microsoft.com/office/powerpoint/2010/main">
+    <mc:Choice Requires="p14">
       <p:transition spd="med" p14:dur="700">
         <p:fade/>
       </p:transition>
     </mc:Choice>
-    <mc:Fallback>
+    <mc:Fallback xmlns="">
       <p:transition spd="med">
         <p:fade/>
       </p:transition>
@@ -10457,13 +10454,13 @@
   <p:clrMapOvr>
     <a:masterClrMapping/>
   </p:clrMapOvr>
-  <mc:AlternateContent xmlns:mc="http://schemas.openxmlformats.org/markup-compatibility/2006">
-    <mc:Choice xmlns:p14="http://schemas.microsoft.com/office/powerpoint/2010/main" Requires="p14">
+  <mc:AlternateContent xmlns:mc="http://schemas.openxmlformats.org/markup-compatibility/2006" xmlns:p14="http://schemas.microsoft.com/office/powerpoint/2010/main">
+    <mc:Choice Requires="p14">
       <p:transition spd="med" p14:dur="700">
         <p:fade/>
       </p:transition>
     </mc:Choice>
-    <mc:Fallback>
+    <mc:Fallback xmlns="">
       <p:transition spd="med">
         <p:fade/>
       </p:transition>
@@ -10514,7 +10511,11 @@
             <a:pPr algn="ctr"/>
             <a:r>
               <a:rPr lang="es-ES" dirty="0" smtClean="0"/>
-              <a:t>Graficas de trabajo</a:t>
+              <a:t>Gráficas </a:t>
+            </a:r>
+            <a:r>
+              <a:rPr lang="es-ES" dirty="0" smtClean="0"/>
+              <a:t>de trabajo</a:t>
             </a:r>
             <a:endParaRPr lang="es-ES" dirty="0"/>
           </a:p>
@@ -10554,13 +10555,13 @@
   <p:clrMapOvr>
     <a:masterClrMapping/>
   </p:clrMapOvr>
-  <mc:AlternateContent xmlns:mc="http://schemas.openxmlformats.org/markup-compatibility/2006">
-    <mc:Choice xmlns:p14="http://schemas.microsoft.com/office/powerpoint/2010/main" Requires="p14">
+  <mc:AlternateContent xmlns:mc="http://schemas.openxmlformats.org/markup-compatibility/2006" xmlns:p14="http://schemas.microsoft.com/office/powerpoint/2010/main">
+    <mc:Choice Requires="p14">
       <p:transition spd="med" p14:dur="700">
         <p:fade/>
       </p:transition>
     </mc:Choice>
-    <mc:Fallback>
+    <mc:Fallback xmlns="">
       <p:transition spd="med">
         <p:fade/>
       </p:transition>
@@ -10611,7 +10612,11 @@
             <a:pPr algn="ctr"/>
             <a:r>
               <a:rPr lang="es-ES" dirty="0" smtClean="0"/>
-              <a:t>Graficas de trabajo</a:t>
+              <a:t>Gráficas </a:t>
+            </a:r>
+            <a:r>
+              <a:rPr lang="es-ES" dirty="0" smtClean="0"/>
+              <a:t>de trabajo</a:t>
             </a:r>
             <a:endParaRPr lang="es-ES" dirty="0"/>
           </a:p>
@@ -10651,13 +10656,13 @@
   <p:clrMapOvr>
     <a:masterClrMapping/>
   </p:clrMapOvr>
-  <mc:AlternateContent xmlns:mc="http://schemas.openxmlformats.org/markup-compatibility/2006">
-    <mc:Choice xmlns:p14="http://schemas.microsoft.com/office/powerpoint/2010/main" Requires="p14">
+  <mc:AlternateContent xmlns:mc="http://schemas.openxmlformats.org/markup-compatibility/2006" xmlns:p14="http://schemas.microsoft.com/office/powerpoint/2010/main">
+    <mc:Choice Requires="p14">
       <p:transition spd="med" p14:dur="700">
         <p:fade/>
       </p:transition>
     </mc:Choice>
-    <mc:Fallback>
+    <mc:Fallback xmlns="">
       <p:transition spd="med">
         <p:fade/>
       </p:transition>
@@ -11215,7 +11220,15 @@
           <a:p>
             <a:r>
               <a:rPr lang="es-ES" sz="4000" dirty="0" smtClean="0"/>
-              <a:t>Gestión de tarjeta universitarias</a:t>
+              <a:t>Gestión de </a:t>
+            </a:r>
+            <a:r>
+              <a:rPr lang="es-ES" sz="4000" dirty="0" smtClean="0"/>
+              <a:t>tarjetas </a:t>
+            </a:r>
+            <a:r>
+              <a:rPr lang="es-ES" sz="4000" dirty="0" smtClean="0"/>
+              <a:t>universitarias</a:t>
             </a:r>
             <a:endParaRPr lang="es-ES" sz="4000" dirty="0"/>
           </a:p>
@@ -11231,13 +11244,13 @@
   <p:clrMapOvr>
     <a:masterClrMapping/>
   </p:clrMapOvr>
-  <mc:AlternateContent xmlns:mc="http://schemas.openxmlformats.org/markup-compatibility/2006">
-    <mc:Choice xmlns:p14="http://schemas.microsoft.com/office/powerpoint/2010/main" Requires="p14">
+  <mc:AlternateContent xmlns:mc="http://schemas.openxmlformats.org/markup-compatibility/2006" xmlns:p14="http://schemas.microsoft.com/office/powerpoint/2010/main">
+    <mc:Choice Requires="p14">
       <p:transition spd="med" p14:dur="700">
         <p:fade/>
       </p:transition>
     </mc:Choice>
-    <mc:Fallback>
+    <mc:Fallback xmlns="">
       <p:transition spd="med">
         <p:fade/>
       </p:transition>
@@ -11326,13 +11339,13 @@
   <p:clrMapOvr>
     <a:masterClrMapping/>
   </p:clrMapOvr>
-  <mc:AlternateContent xmlns:mc="http://schemas.openxmlformats.org/markup-compatibility/2006">
-    <mc:Choice xmlns:p14="http://schemas.microsoft.com/office/powerpoint/2010/main" Requires="p14">
+  <mc:AlternateContent xmlns:mc="http://schemas.openxmlformats.org/markup-compatibility/2006" xmlns:p14="http://schemas.microsoft.com/office/powerpoint/2010/main">
+    <mc:Choice Requires="p14">
       <p:transition spd="med" p14:dur="700">
         <p:fade/>
       </p:transition>
     </mc:Choice>
-    <mc:Fallback>
+    <mc:Fallback xmlns="">
       <p:transition spd="med">
         <p:fade/>
       </p:transition>
@@ -11538,16 +11551,8 @@
               <a:t>Brian </a:t>
             </a:r>
             <a:r>
-              <a:rPr lang="es-ES" sz="1350" dirty="0" err="1"/>
-              <a:t>Saul</a:t>
-            </a:r>
-            <a:r>
-              <a:rPr lang="es-ES" sz="1350" dirty="0"/>
-              <a:t> </a:t>
-            </a:r>
-            <a:r>
-              <a:rPr lang="es-ES" sz="1350" dirty="0" err="1"/>
-              <a:t>Vazquez</a:t>
+              <a:rPr lang="es-ES" sz="1350" dirty="0" smtClean="0"/>
+              <a:t>Saúl Vázquez</a:t>
             </a:r>
             <a:endParaRPr lang="es-ES" sz="1350" dirty="0"/>
           </a:p>
@@ -11584,13 +11589,13 @@
   <p:clrMapOvr>
     <a:masterClrMapping/>
   </p:clrMapOvr>
-  <mc:AlternateContent xmlns:mc="http://schemas.openxmlformats.org/markup-compatibility/2006">
-    <mc:Choice xmlns:p14="http://schemas.microsoft.com/office/powerpoint/2010/main" Requires="p14">
+  <mc:AlternateContent xmlns:mc="http://schemas.openxmlformats.org/markup-compatibility/2006" xmlns:p14="http://schemas.microsoft.com/office/powerpoint/2010/main">
+    <mc:Choice Requires="p14">
       <p:transition spd="med" p14:dur="700">
         <p:fade/>
       </p:transition>
     </mc:Choice>
-    <mc:Fallback>
+    <mc:Fallback xmlns="">
       <p:transition spd="med">
         <p:fade/>
       </p:transition>
@@ -11683,13 +11688,13 @@
   <p:clrMapOvr>
     <a:masterClrMapping/>
   </p:clrMapOvr>
-  <mc:AlternateContent xmlns:mc="http://schemas.openxmlformats.org/markup-compatibility/2006">
-    <mc:Choice xmlns:p14="http://schemas.microsoft.com/office/powerpoint/2010/main" Requires="p14">
+  <mc:AlternateContent xmlns:mc="http://schemas.openxmlformats.org/markup-compatibility/2006" xmlns:p14="http://schemas.microsoft.com/office/powerpoint/2010/main">
+    <mc:Choice Requires="p14">
       <p:transition spd="med" p14:dur="700">
         <p:fade/>
       </p:transition>
     </mc:Choice>
-    <mc:Fallback>
+    <mc:Fallback xmlns="">
       <p:transition spd="med">
         <p:fade/>
       </p:transition>
@@ -11780,13 +11785,13 @@
   <p:clrMapOvr>
     <a:masterClrMapping/>
   </p:clrMapOvr>
-  <mc:AlternateContent xmlns:mc="http://schemas.openxmlformats.org/markup-compatibility/2006">
-    <mc:Choice xmlns:p14="http://schemas.microsoft.com/office/powerpoint/2010/main" Requires="p14">
+  <mc:AlternateContent xmlns:mc="http://schemas.openxmlformats.org/markup-compatibility/2006" xmlns:p14="http://schemas.microsoft.com/office/powerpoint/2010/main">
+    <mc:Choice Requires="p14">
       <p:transition spd="med" p14:dur="700">
         <p:fade/>
       </p:transition>
     </mc:Choice>
-    <mc:Fallback>
+    <mc:Fallback xmlns="">
       <p:transition spd="med">
         <p:fade/>
       </p:transition>
@@ -11871,13 +11876,13 @@
   <p:clrMapOvr>
     <a:masterClrMapping/>
   </p:clrMapOvr>
-  <mc:AlternateContent xmlns:mc="http://schemas.openxmlformats.org/markup-compatibility/2006">
-    <mc:Choice xmlns:p14="http://schemas.microsoft.com/office/powerpoint/2010/main" Requires="p14">
+  <mc:AlternateContent xmlns:mc="http://schemas.openxmlformats.org/markup-compatibility/2006" xmlns:p14="http://schemas.microsoft.com/office/powerpoint/2010/main">
+    <mc:Choice Requires="p14">
       <p:transition spd="med" p14:dur="700">
         <p:fade/>
       </p:transition>
     </mc:Choice>
-    <mc:Fallback>
+    <mc:Fallback xmlns="">
       <p:transition spd="med">
         <p:fade/>
       </p:transition>
@@ -11936,7 +11941,7 @@
     </a:clrScheme>
     <a:fontScheme name="Faceta">
       <a:majorFont>
-        <a:latin typeface="Trebuchet MS" panose="020B0603020202020204"/>
+        <a:latin typeface="Trebuchet MS"/>
         <a:ea typeface=""/>
         <a:cs typeface=""/>
         <a:font script="Jpan" typeface="メイリオ"/>
@@ -11971,7 +11976,7 @@
         <a:font script="Geor" typeface="Sylfaen"/>
       </a:majorFont>
       <a:minorFont>
-        <a:latin typeface="Trebuchet MS" panose="020B0603020202020204"/>
+        <a:latin typeface="Trebuchet MS"/>
         <a:ea typeface=""/>
         <a:cs typeface=""/>
         <a:font script="Jpan" typeface="メイリオ"/>
@@ -12144,7 +12149,7 @@
   <a:extraClrSchemeLst/>
   <a:extLst>
     <a:ext uri="{05A4C25C-085E-4340-85A3-A5531E510DB2}">
-      <thm15:themeFamily xmlns:thm15="http://schemas.microsoft.com/office/thememl/2012/main" name="Facet" id="{C0C680CD-088A-49FC-A102-D699147F32B2}" vid="{CFBC31BA-B70F-4F30-BCAA-4F3011E16C4D}"/>
+      <thm15:themeFamily xmlns:thm15="http://schemas.microsoft.com/office/thememl/2012/main" xmlns="" name="Facet" id="{C0C680CD-088A-49FC-A102-D699147F32B2}" vid="{CFBC31BA-B70F-4F30-BCAA-4F3011E16C4D}"/>
     </a:ext>
   </a:extLst>
 </a:theme>
@@ -12193,7 +12198,7 @@
     </a:clrScheme>
     <a:fontScheme name="Office">
       <a:majorFont>
-        <a:latin typeface="Calibri Light" panose="020F0302020204030204"/>
+        <a:latin typeface="Calibri Light"/>
         <a:ea typeface=""/>
         <a:cs typeface=""/>
         <a:font script="Jpan" typeface="ＭＳ Ｐゴシック"/>
@@ -12228,7 +12233,7 @@
         <a:font script="Geor" typeface="Sylfaen"/>
       </a:majorFont>
       <a:minorFont>
-        <a:latin typeface="Calibri" panose="020F0502020204030204"/>
+        <a:latin typeface="Calibri"/>
         <a:ea typeface=""/>
         <a:cs typeface=""/>
         <a:font script="Jpan" typeface="ＭＳ Ｐゴシック"/>
@@ -12405,7 +12410,7 @@
   <a:extraClrSchemeLst/>
   <a:extLst>
     <a:ext uri="{05A4C25C-085E-4340-85A3-A5531E510DB2}">
-      <thm15:themeFamily xmlns:thm15="http://schemas.microsoft.com/office/thememl/2012/main" name="Office Theme" id="{62F939B6-93AF-4DB8-9C6B-D6C7DFDC589F}" vid="{4A3C46E8-61CC-4603-A589-7422A47A8E4A}"/>
+      <thm15:themeFamily xmlns:thm15="http://schemas.microsoft.com/office/thememl/2012/main" xmlns="" name="Office Theme" id="{62F939B6-93AF-4DB8-9C6B-D6C7DFDC589F}" vid="{4A3C46E8-61CC-4603-A589-7422A47A8E4A}"/>
     </a:ext>
   </a:extLst>
 </a:theme>

</xml_diff>